<commit_message>
Poster has been added
</commit_message>
<xml_diff>
--- a/reports/Fall-2017-Poster.pptx
+++ b/reports/Fall-2017-Poster.pptx
@@ -4100,8 +4100,8 @@
         </p:nvSpPr>
         <p:spPr bwMode="auto">
           <a:xfrm>
-            <a:off x="551811" y="5431124"/>
-            <a:ext cx="14007415" cy="1092741"/>
+            <a:off x="551811" y="5498464"/>
+            <a:ext cx="14405159" cy="960698"/>
           </a:xfrm>
           <a:prstGeom prst="rect">
             <a:avLst/>
@@ -4132,7 +4132,9 @@
           </a:effectLst>
         </p:spPr>
         <p:txBody>
-          <a:bodyPr wrap="none" lIns="152956" tIns="76479" rIns="152956" bIns="76479" anchor="ctr"/>
+          <a:bodyPr wrap="square" lIns="152956" tIns="76479" rIns="152956" bIns="76479" anchor="ctr">
+            <a:spAutoFit/>
+          </a:bodyPr>
           <a:lstStyle/>
           <a:p>
             <a:pPr marL="796653" indent="-796653" defTabSz="5244629">
@@ -4171,8 +4173,8 @@
         </p:nvSpPr>
         <p:spPr bwMode="auto">
           <a:xfrm>
-            <a:off x="551811" y="12160851"/>
-            <a:ext cx="13889136" cy="1032949"/>
+            <a:off x="551810" y="11124027"/>
+            <a:ext cx="14405159" cy="960698"/>
           </a:xfrm>
           <a:prstGeom prst="rect">
             <a:avLst/>
@@ -4203,7 +4205,9 @@
           </a:effectLst>
         </p:spPr>
         <p:txBody>
-          <a:bodyPr wrap="none" lIns="152956" tIns="76479" rIns="152956" bIns="76479" anchor="ctr"/>
+          <a:bodyPr wrap="square" lIns="152956" tIns="76479" rIns="152956" bIns="76479" anchor="ctr">
+            <a:spAutoFit/>
+          </a:bodyPr>
           <a:lstStyle/>
           <a:p>
             <a:pPr defTabSz="5244629"/>
@@ -4340,8 +4344,8 @@
         </p:nvSpPr>
         <p:spPr bwMode="auto">
           <a:xfrm>
-            <a:off x="453916" y="18871992"/>
-            <a:ext cx="13889136" cy="1032949"/>
+            <a:off x="527899" y="16883263"/>
+            <a:ext cx="14429069" cy="960698"/>
           </a:xfrm>
           <a:prstGeom prst="rect">
             <a:avLst/>
@@ -4372,7 +4376,9 @@
           </a:effectLst>
         </p:spPr>
         <p:txBody>
-          <a:bodyPr wrap="none" lIns="152956" tIns="76479" rIns="152956" bIns="76479" anchor="ctr"/>
+          <a:bodyPr wrap="square" lIns="152956" tIns="76479" rIns="152956" bIns="76479" anchor="ctr">
+            <a:spAutoFit/>
+          </a:bodyPr>
           <a:lstStyle/>
           <a:p>
             <a:pPr defTabSz="5244629"/>
@@ -4419,8 +4425,8 @@
         </p:nvSpPr>
         <p:spPr bwMode="auto">
           <a:xfrm>
-            <a:off x="16018784" y="5490916"/>
-            <a:ext cx="13889136" cy="1032949"/>
+            <a:off x="15502760" y="5495417"/>
+            <a:ext cx="14405159" cy="1028038"/>
           </a:xfrm>
           <a:prstGeom prst="rect">
             <a:avLst/>
@@ -4498,8 +4504,8 @@
         </p:nvSpPr>
         <p:spPr bwMode="auto">
           <a:xfrm>
-            <a:off x="16018784" y="13372325"/>
-            <a:ext cx="13889136" cy="1032949"/>
+            <a:off x="15502758" y="16883263"/>
+            <a:ext cx="14405159" cy="960698"/>
           </a:xfrm>
           <a:prstGeom prst="rect">
             <a:avLst/>
@@ -4530,32 +4536,20 @@
           </a:effectLst>
         </p:spPr>
         <p:txBody>
-          <a:bodyPr wrap="none" lIns="152956" tIns="76479" rIns="152956" bIns="76479" anchor="ctr"/>
+          <a:bodyPr wrap="square" lIns="152956" tIns="76479" rIns="152956" bIns="76479" anchor="ctr">
+            <a:spAutoFit/>
+          </a:bodyPr>
           <a:lstStyle/>
           <a:p>
             <a:pPr defTabSz="5244629"/>
             <a:r>
-              <a:rPr lang="en-US" sz="5239" smtClean="0">
+              <a:rPr lang="en-US" sz="5239" dirty="0" smtClean="0">
                 <a:solidFill>
                   <a:schemeClr val="bg1"/>
                 </a:solidFill>
                 <a:sym typeface="Symbol" pitchFamily="18" charset="2"/>
               </a:rPr>
-              <a:t></a:t>
-            </a:r>
-            <a:r>
-              <a:rPr lang="en-US" sz="5239" smtClean="0"/>
-              <a:t> </a:t>
-            </a:r>
-            <a:r>
-              <a:rPr lang="en-US" sz="5239" smtClean="0">
-                <a:solidFill>
-                  <a:schemeClr val="bg1"/>
-                </a:solidFill>
-                <a:latin typeface="Arial"/>
-                <a:cs typeface="Arial"/>
-              </a:rPr>
-              <a:t>Egalitarian SMPTI</a:t>
+              <a:t>Optimization Variants</a:t>
             </a:r>
             <a:endParaRPr lang="en-US" sz="5239" dirty="0">
               <a:solidFill>
@@ -4569,7 +4563,7 @@
       </p:sp>
       <p:sp>
         <p:nvSpPr>
-          <p:cNvPr id="62" name="Rectangle 7"/>
+          <p:cNvPr id="64" name="Rectangle 7"/>
           <p:cNvSpPr>
             <a:spLocks noChangeArrowheads="1"/>
           </p:cNvSpPr>
@@ -4577,8 +4571,8 @@
         </p:nvSpPr>
         <p:spPr bwMode="auto">
           <a:xfrm>
-            <a:off x="15934209" y="17839043"/>
-            <a:ext cx="13889136" cy="1032949"/>
+            <a:off x="15502759" y="30279374"/>
+            <a:ext cx="14320583" cy="960698"/>
           </a:xfrm>
           <a:prstGeom prst="rect">
             <a:avLst/>
@@ -4609,7 +4603,9 @@
           </a:effectLst>
         </p:spPr>
         <p:txBody>
-          <a:bodyPr wrap="none" lIns="152956" tIns="76479" rIns="152956" bIns="76479" anchor="ctr"/>
+          <a:bodyPr wrap="square" lIns="152956" tIns="76479" rIns="152956" bIns="76479" anchor="ctr">
+            <a:spAutoFit/>
+          </a:bodyPr>
           <a:lstStyle/>
           <a:p>
             <a:pPr defTabSz="5244629"/>
@@ -4627,14 +4623,14 @@
               <a:t> </a:t>
             </a:r>
             <a:r>
-              <a:rPr lang="en-US" sz="5239" smtClean="0">
+              <a:rPr lang="en-US" sz="5239" dirty="0" smtClean="0">
                 <a:solidFill>
                   <a:schemeClr val="bg1"/>
                 </a:solidFill>
                 <a:latin typeface="Arial"/>
                 <a:cs typeface="Arial"/>
               </a:rPr>
-              <a:t>Sex Equal SMPTI</a:t>
+              <a:t>Conclusions</a:t>
             </a:r>
             <a:endParaRPr lang="en-US" sz="5239" dirty="0">
               <a:solidFill>
@@ -4648,7 +4644,7 @@
       </p:sp>
       <p:sp>
         <p:nvSpPr>
-          <p:cNvPr id="63" name="Rectangle 7"/>
+          <p:cNvPr id="65" name="Rectangle 7"/>
           <p:cNvSpPr>
             <a:spLocks noChangeArrowheads="1"/>
           </p:cNvSpPr>
@@ -4656,8 +4652,8 @@
         </p:nvSpPr>
         <p:spPr bwMode="auto">
           <a:xfrm>
-            <a:off x="16018784" y="22305761"/>
-            <a:ext cx="13889136" cy="1032949"/>
+            <a:off x="551810" y="37595011"/>
+            <a:ext cx="29356107" cy="960698"/>
           </a:xfrm>
           <a:prstGeom prst="rect">
             <a:avLst/>
@@ -4688,175 +4684,9 @@
           </a:effectLst>
         </p:spPr>
         <p:txBody>
-          <a:bodyPr wrap="none" lIns="152956" tIns="76479" rIns="152956" bIns="76479" anchor="ctr"/>
-          <a:lstStyle/>
-          <a:p>
-            <a:pPr defTabSz="5244629"/>
-            <a:r>
-              <a:rPr lang="en-US" sz="5239" dirty="0" smtClean="0">
-                <a:solidFill>
-                  <a:schemeClr val="bg1"/>
-                </a:solidFill>
-                <a:sym typeface="Symbol" pitchFamily="18" charset="2"/>
-              </a:rPr>
-              <a:t></a:t>
-            </a:r>
-            <a:r>
-              <a:rPr lang="en-US" sz="5239" dirty="0" smtClean="0"/>
-              <a:t> </a:t>
-            </a:r>
-            <a:r>
-              <a:rPr lang="en-US" sz="5239" smtClean="0">
-                <a:solidFill>
-                  <a:schemeClr val="bg1"/>
-                </a:solidFill>
-                <a:latin typeface="Arial"/>
-                <a:cs typeface="Arial"/>
-              </a:rPr>
-              <a:t>Minimum Regret </a:t>
-            </a:r>
-            <a:r>
-              <a:rPr lang="en-US" sz="5239" smtClean="0">
-                <a:solidFill>
-                  <a:schemeClr val="bg1"/>
-                </a:solidFill>
-                <a:latin typeface="Arial"/>
-                <a:cs typeface="Arial"/>
-              </a:rPr>
-              <a:t>SMPTI</a:t>
-            </a:r>
-            <a:endParaRPr lang="en-US" sz="5239" dirty="0">
-              <a:solidFill>
-                <a:schemeClr val="bg1"/>
-              </a:solidFill>
-              <a:latin typeface="Arial"/>
-              <a:cs typeface="Arial"/>
-            </a:endParaRPr>
-          </a:p>
-        </p:txBody>
-      </p:sp>
-      <p:sp>
-        <p:nvSpPr>
-          <p:cNvPr id="64" name="Rectangle 7"/>
-          <p:cNvSpPr>
-            <a:spLocks noChangeArrowheads="1"/>
-          </p:cNvSpPr>
-          <p:nvPr/>
-        </p:nvSpPr>
-        <p:spPr bwMode="auto">
-          <a:xfrm>
-            <a:off x="15934209" y="26772479"/>
-            <a:ext cx="13889136" cy="1032949"/>
-          </a:xfrm>
-          <a:prstGeom prst="rect">
-            <a:avLst/>
-          </a:prstGeom>
-          <a:gradFill>
-            <a:gsLst>
-              <a:gs pos="5000">
-                <a:schemeClr val="accent6">
-                  <a:lumMod val="75000"/>
-                </a:schemeClr>
-              </a:gs>
-              <a:gs pos="100000">
-                <a:schemeClr val="accent5">
-                  <a:lumMod val="60000"/>
-                  <a:lumOff val="40000"/>
-                </a:schemeClr>
-              </a:gs>
-            </a:gsLst>
-            <a:lin ang="0" scaled="1"/>
-          </a:gradFill>
-          <a:ln>
-            <a:noFill/>
-          </a:ln>
-          <a:effectLst>
-            <a:outerShdw dist="107763" dir="2700000" algn="ctr" rotWithShape="0">
-              <a:schemeClr val="bg2"/>
-            </a:outerShdw>
-          </a:effectLst>
-        </p:spPr>
-        <p:txBody>
-          <a:bodyPr wrap="none" lIns="152956" tIns="76479" rIns="152956" bIns="76479" anchor="ctr"/>
-          <a:lstStyle/>
-          <a:p>
-            <a:pPr defTabSz="5244629"/>
-            <a:r>
-              <a:rPr lang="en-US" sz="5239" dirty="0" smtClean="0">
-                <a:solidFill>
-                  <a:schemeClr val="bg1"/>
-                </a:solidFill>
-                <a:sym typeface="Symbol" pitchFamily="18" charset="2"/>
-              </a:rPr>
-              <a:t></a:t>
-            </a:r>
-            <a:r>
-              <a:rPr lang="en-US" sz="5239" dirty="0" smtClean="0"/>
-              <a:t> </a:t>
-            </a:r>
-            <a:r>
-              <a:rPr lang="en-US" sz="5239" dirty="0" smtClean="0">
-                <a:solidFill>
-                  <a:schemeClr val="bg1"/>
-                </a:solidFill>
-                <a:latin typeface="Arial"/>
-                <a:cs typeface="Arial"/>
-              </a:rPr>
-              <a:t>Conclusions</a:t>
-            </a:r>
-            <a:endParaRPr lang="en-US" sz="5239" dirty="0">
-              <a:solidFill>
-                <a:schemeClr val="bg1"/>
-              </a:solidFill>
-              <a:latin typeface="Arial"/>
-              <a:cs typeface="Arial"/>
-            </a:endParaRPr>
-          </a:p>
-        </p:txBody>
-      </p:sp>
-      <p:sp>
-        <p:nvSpPr>
-          <p:cNvPr id="65" name="Rectangle 7"/>
-          <p:cNvSpPr>
-            <a:spLocks noChangeArrowheads="1"/>
-          </p:cNvSpPr>
-          <p:nvPr/>
-        </p:nvSpPr>
-        <p:spPr bwMode="auto">
-          <a:xfrm>
-            <a:off x="15934209" y="35705915"/>
-            <a:ext cx="13889136" cy="1032949"/>
-          </a:xfrm>
-          <a:prstGeom prst="rect">
-            <a:avLst/>
-          </a:prstGeom>
-          <a:gradFill>
-            <a:gsLst>
-              <a:gs pos="5000">
-                <a:schemeClr val="accent6">
-                  <a:lumMod val="75000"/>
-                </a:schemeClr>
-              </a:gs>
-              <a:gs pos="100000">
-                <a:schemeClr val="accent5">
-                  <a:lumMod val="60000"/>
-                  <a:lumOff val="40000"/>
-                </a:schemeClr>
-              </a:gs>
-            </a:gsLst>
-            <a:lin ang="0" scaled="1"/>
-          </a:gradFill>
-          <a:ln>
-            <a:noFill/>
-          </a:ln>
-          <a:effectLst>
-            <a:outerShdw dist="107763" dir="2700000" algn="ctr" rotWithShape="0">
-              <a:schemeClr val="bg2"/>
-            </a:outerShdw>
-          </a:effectLst>
-        </p:spPr>
-        <p:txBody>
-          <a:bodyPr wrap="none" lIns="152956" tIns="76479" rIns="152956" bIns="76479" anchor="ctr"/>
+          <a:bodyPr wrap="square" lIns="152956" tIns="76479" rIns="152956" bIns="76479" anchor="ctr">
+            <a:spAutoFit/>
+          </a:bodyPr>
           <a:lstStyle/>
           <a:p>
             <a:pPr defTabSz="5244629"/>
@@ -4893,6 +4723,1926 @@
           </a:p>
         </p:txBody>
       </p:sp>
+      <p:sp>
+        <p:nvSpPr>
+          <p:cNvPr id="2" name="TextBox 1"/>
+          <p:cNvSpPr txBox="1"/>
+          <p:nvPr/>
+        </p:nvSpPr>
+        <p:spPr>
+          <a:xfrm>
+            <a:off x="15502758" y="31388547"/>
+            <a:ext cx="14320584" cy="6001643"/>
+          </a:xfrm>
+          <a:prstGeom prst="rect">
+            <a:avLst/>
+          </a:prstGeom>
+          <a:noFill/>
+        </p:spPr>
+        <p:txBody>
+          <a:bodyPr wrap="square" rtlCol="0">
+            <a:spAutoFit/>
+          </a:bodyPr>
+          <a:lstStyle/>
+          <a:p>
+            <a:pPr algn="just"/>
+            <a:r>
+              <a:rPr lang="en-US" sz="4800" dirty="0" smtClean="0"/>
+              <a:t>Our </a:t>
+            </a:r>
+            <a:r>
+              <a:rPr lang="en-US" sz="4800" dirty="0"/>
+              <a:t>main focus was on how matching as a real life problem can be interpreted and represented as a mathematical </a:t>
+            </a:r>
+            <a:r>
+              <a:rPr lang="en-US" sz="4800" dirty="0" smtClean="0"/>
+              <a:t>question. For this purpose, we </a:t>
+            </a:r>
+            <a:r>
+              <a:rPr lang="en-US" sz="4800" dirty="0"/>
+              <a:t>have designed programs to solve and </a:t>
+            </a:r>
+            <a:r>
+              <a:rPr lang="en-US" sz="4800" dirty="0" smtClean="0"/>
+              <a:t>optimize </a:t>
+            </a:r>
+            <a:r>
+              <a:rPr lang="en-US" sz="4800" dirty="0"/>
+              <a:t>variants of stable marriage problem with respect to equality of individuals and sexes</a:t>
+            </a:r>
+            <a:r>
+              <a:rPr lang="en-US" sz="4800" dirty="0" smtClean="0"/>
+              <a:t>.</a:t>
+            </a:r>
+          </a:p>
+          <a:p>
+            <a:pPr algn="just"/>
+            <a:r>
+              <a:rPr lang="en-US" sz="4800" dirty="0" smtClean="0"/>
+              <a:t>Our </a:t>
+            </a:r>
+            <a:r>
+              <a:rPr lang="en-US" sz="4800" dirty="0"/>
+              <a:t>work will be continued in Spring ’18 and </a:t>
+            </a:r>
+            <a:r>
+              <a:rPr lang="en-US" sz="4800" dirty="0" smtClean="0"/>
+              <a:t>we plan </a:t>
+            </a:r>
+            <a:r>
+              <a:rPr lang="en-US" sz="4800" dirty="0"/>
+              <a:t>to solve more real life </a:t>
+            </a:r>
+            <a:r>
+              <a:rPr lang="en-US" sz="4800" dirty="0" smtClean="0"/>
+              <a:t>problems in the future.</a:t>
+            </a:r>
+            <a:endParaRPr lang="en-US" sz="4800" dirty="0"/>
+          </a:p>
+        </p:txBody>
+      </p:sp>
+      <p:sp>
+        <p:nvSpPr>
+          <p:cNvPr id="3" name="TextBox 2"/>
+          <p:cNvSpPr txBox="1"/>
+          <p:nvPr/>
+        </p:nvSpPr>
+        <p:spPr>
+          <a:xfrm>
+            <a:off x="551810" y="38704184"/>
+            <a:ext cx="29380018" cy="4185761"/>
+          </a:xfrm>
+          <a:prstGeom prst="rect">
+            <a:avLst/>
+          </a:prstGeom>
+          <a:noFill/>
+        </p:spPr>
+        <p:txBody>
+          <a:bodyPr wrap="square" rtlCol="0">
+            <a:spAutoFit/>
+          </a:bodyPr>
+          <a:lstStyle/>
+          <a:p>
+            <a:pPr marL="742950" indent="-742950" algn="just">
+              <a:buFont typeface="+mj-lt"/>
+              <a:buAutoNum type="arabicPeriod"/>
+            </a:pPr>
+            <a:r>
+              <a:rPr lang="en-US" sz="3800" dirty="0" smtClean="0"/>
+              <a:t>Gale</a:t>
+            </a:r>
+            <a:r>
+              <a:rPr lang="en-US" sz="3800" dirty="0"/>
+              <a:t>, D., &amp; Shapley, L. (1962). </a:t>
+            </a:r>
+            <a:r>
+              <a:rPr lang="en-US" sz="3800" i="1" dirty="0"/>
+              <a:t>College Admissions and the </a:t>
+            </a:r>
+            <a:r>
+              <a:rPr lang="en-US" sz="3800" i="1" dirty="0" smtClean="0"/>
+              <a:t>Stability </a:t>
+            </a:r>
+            <a:r>
+              <a:rPr lang="en-US" sz="3800" i="1" dirty="0"/>
+              <a:t>of Marriage.</a:t>
+            </a:r>
+            <a:r>
+              <a:rPr lang="en-US" sz="3800" dirty="0"/>
+              <a:t> </a:t>
+            </a:r>
+            <a:r>
+              <a:rPr lang="en-US" sz="3800" dirty="0" smtClean="0"/>
+              <a:t>The </a:t>
+            </a:r>
+            <a:r>
+              <a:rPr lang="en-US" sz="3800" dirty="0"/>
+              <a:t>American Mathematical Monthly, 69(1), 9-15.</a:t>
+            </a:r>
+          </a:p>
+          <a:p>
+            <a:pPr marL="742950" indent="-742950" algn="just">
+              <a:buFont typeface="+mj-lt"/>
+              <a:buAutoNum type="arabicPeriod"/>
+            </a:pPr>
+            <a:r>
+              <a:rPr lang="en-US" sz="3800" dirty="0" err="1" smtClean="0"/>
+              <a:t>Gelfond</a:t>
+            </a:r>
+            <a:r>
+              <a:rPr lang="en-US" sz="3800" dirty="0"/>
+              <a:t>, M., &amp; </a:t>
+            </a:r>
+            <a:r>
+              <a:rPr lang="en-US" sz="3800" dirty="0" err="1"/>
+              <a:t>Lifschitz</a:t>
+            </a:r>
+            <a:r>
+              <a:rPr lang="en-US" sz="3800" dirty="0"/>
+              <a:t>, V. (1988). </a:t>
+            </a:r>
+            <a:r>
+              <a:rPr lang="en-US" sz="3800" i="1" dirty="0"/>
+              <a:t>The stable model semantics for logic </a:t>
+            </a:r>
+            <a:r>
+              <a:rPr lang="en-US" sz="3800" i="1" dirty="0" smtClean="0"/>
+              <a:t>programming</a:t>
+            </a:r>
+            <a:r>
+              <a:rPr lang="en-US" sz="3800" i="1" dirty="0"/>
+              <a:t>. </a:t>
+            </a:r>
+            <a:r>
+              <a:rPr lang="en-US" sz="3800" dirty="0"/>
+              <a:t> In Proceedings of International Logic Programming </a:t>
+            </a:r>
+            <a:r>
+              <a:rPr lang="en-US" sz="3800" dirty="0" smtClean="0"/>
+              <a:t>Conference and </a:t>
+            </a:r>
+            <a:r>
+              <a:rPr lang="en-US" sz="3800" dirty="0"/>
+              <a:t>Symposium, pp. 1070-1080.</a:t>
+            </a:r>
+          </a:p>
+          <a:p>
+            <a:pPr marL="742950" indent="-742950" algn="just">
+              <a:buFont typeface="+mj-lt"/>
+              <a:buAutoNum type="arabicPeriod"/>
+            </a:pPr>
+            <a:r>
+              <a:rPr lang="en-US" sz="3800" dirty="0" err="1" smtClean="0"/>
+              <a:t>Gebser</a:t>
+            </a:r>
+            <a:r>
+              <a:rPr lang="en-US" sz="3800" dirty="0"/>
+              <a:t>, M., Kaminski, R., Kaufmann, B., &amp; Schaub, T. (2014). </a:t>
+            </a:r>
+            <a:r>
+              <a:rPr lang="en-US" sz="3800" i="1" dirty="0" err="1"/>
+              <a:t>Clingo</a:t>
+            </a:r>
+            <a:r>
+              <a:rPr lang="en-US" sz="3800" i="1" dirty="0"/>
+              <a:t> </a:t>
+            </a:r>
+            <a:r>
+              <a:rPr lang="en-US" sz="3800" i="1" dirty="0" smtClean="0"/>
+              <a:t>= ASP </a:t>
+            </a:r>
+            <a:r>
+              <a:rPr lang="en-US" sz="3800" i="1" dirty="0"/>
+              <a:t>+ Control: Preliminary Report. </a:t>
+            </a:r>
+            <a:r>
+              <a:rPr lang="en-US" sz="3800" dirty="0"/>
+              <a:t> In proceedings of the 2014 </a:t>
+            </a:r>
+            <a:r>
+              <a:rPr lang="en-US" sz="3800" dirty="0" smtClean="0"/>
+              <a:t>Technical Communications </a:t>
+            </a:r>
+            <a:r>
+              <a:rPr lang="en-US" sz="3800" dirty="0"/>
+              <a:t>of the Thirtieth International Conference on Logic </a:t>
+            </a:r>
+            <a:r>
+              <a:rPr lang="en-US" sz="3800" dirty="0" smtClean="0"/>
+              <a:t>Programming</a:t>
+            </a:r>
+            <a:r>
+              <a:rPr lang="en-US" sz="3800" dirty="0"/>
+              <a:t>, 14(4-5).</a:t>
+            </a:r>
+          </a:p>
+          <a:p>
+            <a:pPr marL="742950" indent="-742950" algn="just">
+              <a:buFont typeface="+mj-lt"/>
+              <a:buAutoNum type="arabicPeriod"/>
+            </a:pPr>
+            <a:r>
+              <a:rPr lang="en-US" sz="3800" dirty="0" smtClean="0"/>
+              <a:t>Giannakopoulos</a:t>
+            </a:r>
+            <a:r>
+              <a:rPr lang="en-US" sz="3800" dirty="0"/>
+              <a:t>, I., </a:t>
+            </a:r>
+            <a:r>
+              <a:rPr lang="en-US" sz="3800" dirty="0" err="1"/>
+              <a:t>Karras</a:t>
+            </a:r>
+            <a:r>
+              <a:rPr lang="en-US" sz="3800" dirty="0"/>
+              <a:t>, P., </a:t>
+            </a:r>
+            <a:r>
+              <a:rPr lang="en-US" sz="3800" dirty="0" err="1"/>
+              <a:t>Tsoumakos</a:t>
+            </a:r>
+            <a:r>
+              <a:rPr lang="en-US" sz="3800" dirty="0"/>
+              <a:t>, D., Doka, K., &amp; </a:t>
+            </a:r>
+            <a:r>
+              <a:rPr lang="en-US" sz="3800" dirty="0" err="1"/>
+              <a:t>Koziris</a:t>
+            </a:r>
+            <a:r>
+              <a:rPr lang="en-US" sz="3800" dirty="0"/>
+              <a:t>, N</a:t>
+            </a:r>
+            <a:r>
+              <a:rPr lang="en-US" sz="3800" dirty="0" smtClean="0"/>
+              <a:t>. (</a:t>
+            </a:r>
+            <a:r>
+              <a:rPr lang="en-US" sz="3800" dirty="0"/>
+              <a:t>2015). </a:t>
+            </a:r>
+            <a:r>
+              <a:rPr lang="en-US" sz="3800" i="1" dirty="0"/>
+              <a:t>An Equitable Solution to the Stable Marriage Problem. </a:t>
+            </a:r>
+            <a:r>
+              <a:rPr lang="en-US" sz="3800" dirty="0"/>
+              <a:t> In </a:t>
+            </a:r>
+            <a:r>
+              <a:rPr lang="en-US" sz="3800" dirty="0" smtClean="0"/>
+              <a:t>Proceedings </a:t>
+            </a:r>
+            <a:r>
+              <a:rPr lang="en-US" sz="3800" dirty="0"/>
+              <a:t>of the 2015 IEEE 27th International Conference on Tools with </a:t>
+            </a:r>
+            <a:r>
+              <a:rPr lang="en-US" sz="3800" dirty="0" err="1" smtClean="0"/>
+              <a:t>Articial</a:t>
+            </a:r>
+            <a:r>
+              <a:rPr lang="en-US" sz="3800" dirty="0" smtClean="0"/>
+              <a:t> Intelligence</a:t>
+            </a:r>
+            <a:r>
+              <a:rPr lang="en-US" sz="3800" dirty="0"/>
+              <a:t>, pp. 989-996</a:t>
+            </a:r>
+            <a:r>
+              <a:rPr lang="en-US" sz="3800" dirty="0" smtClean="0"/>
+              <a:t>.</a:t>
+            </a:r>
+            <a:endParaRPr lang="en-US" sz="3800" dirty="0"/>
+          </a:p>
+        </p:txBody>
+      </p:sp>
+      <p:sp>
+        <p:nvSpPr>
+          <p:cNvPr id="4" name="Rectangle 3"/>
+          <p:cNvSpPr/>
+          <p:nvPr/>
+        </p:nvSpPr>
+        <p:spPr>
+          <a:xfrm>
+            <a:off x="551810" y="6539479"/>
+            <a:ext cx="14405158" cy="4524315"/>
+          </a:xfrm>
+          <a:prstGeom prst="rect">
+            <a:avLst/>
+          </a:prstGeom>
+        </p:spPr>
+        <p:txBody>
+          <a:bodyPr wrap="square">
+            <a:spAutoFit/>
+          </a:bodyPr>
+          <a:lstStyle/>
+          <a:p>
+            <a:pPr algn="just"/>
+            <a:r>
+              <a:rPr lang="en-US" sz="4800" dirty="0" smtClean="0">
+                <a:solidFill>
+                  <a:srgbClr val="222222"/>
+                </a:solidFill>
+                <a:latin typeface="arial" charset="0"/>
+              </a:rPr>
+              <a:t>Matching </a:t>
+            </a:r>
+            <a:r>
+              <a:rPr lang="en-US" sz="4800" dirty="0">
+                <a:solidFill>
+                  <a:srgbClr val="222222"/>
+                </a:solidFill>
+                <a:latin typeface="arial" charset="0"/>
+              </a:rPr>
+              <a:t>is a daily process for most individuals, </a:t>
+            </a:r>
+            <a:r>
+              <a:rPr lang="en-US" sz="4800" dirty="0" smtClean="0">
+                <a:solidFill>
+                  <a:srgbClr val="222222"/>
+                </a:solidFill>
+                <a:latin typeface="arial" charset="0"/>
+              </a:rPr>
+              <a:t>institutions, and </a:t>
+            </a:r>
+            <a:r>
+              <a:rPr lang="en-US" sz="4800" dirty="0">
+                <a:solidFill>
+                  <a:srgbClr val="222222"/>
+                </a:solidFill>
+                <a:latin typeface="arial" charset="0"/>
+              </a:rPr>
+              <a:t>within the last </a:t>
+            </a:r>
+            <a:r>
+              <a:rPr lang="en-US" sz="4800" dirty="0" smtClean="0">
+                <a:solidFill>
+                  <a:srgbClr val="222222"/>
+                </a:solidFill>
+                <a:latin typeface="arial" charset="0"/>
+              </a:rPr>
+              <a:t>century, robots</a:t>
+            </a:r>
+            <a:r>
+              <a:rPr lang="en-US" sz="4800" dirty="0">
+                <a:solidFill>
+                  <a:srgbClr val="222222"/>
+                </a:solidFill>
+                <a:latin typeface="arial" charset="0"/>
+              </a:rPr>
+              <a:t>. We match all sort of objects and individuals with other objects and individuals to </a:t>
+            </a:r>
+            <a:r>
+              <a:rPr lang="en-US" sz="4800" dirty="0" smtClean="0">
+                <a:solidFill>
+                  <a:srgbClr val="222222"/>
+                </a:solidFill>
+                <a:latin typeface="arial" charset="0"/>
+              </a:rPr>
+              <a:t>find answers </a:t>
+            </a:r>
+            <a:r>
+              <a:rPr lang="en-US" sz="4800" dirty="0">
+                <a:solidFill>
+                  <a:srgbClr val="222222"/>
+                </a:solidFill>
+                <a:latin typeface="arial" charset="0"/>
+              </a:rPr>
+              <a:t>for questions such as “who gets </a:t>
+            </a:r>
+            <a:r>
+              <a:rPr lang="en-US" sz="4800" dirty="0" smtClean="0">
+                <a:solidFill>
+                  <a:srgbClr val="222222"/>
+                </a:solidFill>
+                <a:latin typeface="arial" charset="0"/>
+              </a:rPr>
+              <a:t>what”, “who </a:t>
+            </a:r>
+            <a:r>
+              <a:rPr lang="en-US" sz="4800" dirty="0">
+                <a:solidFill>
+                  <a:srgbClr val="222222"/>
+                </a:solidFill>
+                <a:latin typeface="arial" charset="0"/>
+              </a:rPr>
+              <a:t>works </a:t>
+            </a:r>
+            <a:r>
+              <a:rPr lang="en-US" sz="4800" dirty="0" smtClean="0">
+                <a:solidFill>
+                  <a:srgbClr val="222222"/>
+                </a:solidFill>
+                <a:latin typeface="arial" charset="0"/>
+              </a:rPr>
+              <a:t>where” or  “who </a:t>
+            </a:r>
+            <a:r>
+              <a:rPr lang="en-US" sz="4800" dirty="0">
+                <a:solidFill>
+                  <a:srgbClr val="222222"/>
+                </a:solidFill>
+                <a:latin typeface="arial" charset="0"/>
+              </a:rPr>
+              <a:t>goes to which school</a:t>
+            </a:r>
+            <a:r>
+              <a:rPr lang="en-US" sz="4800" dirty="0" smtClean="0">
+                <a:solidFill>
+                  <a:srgbClr val="222222"/>
+                </a:solidFill>
+                <a:latin typeface="arial" charset="0"/>
+              </a:rPr>
+              <a:t>”.</a:t>
+            </a:r>
+            <a:endParaRPr lang="en-US" sz="4800" dirty="0">
+              <a:solidFill>
+                <a:srgbClr val="222222"/>
+              </a:solidFill>
+              <a:latin typeface="arial" charset="0"/>
+            </a:endParaRPr>
+          </a:p>
+        </p:txBody>
+      </p:sp>
+      <p:sp>
+        <p:nvSpPr>
+          <p:cNvPr id="5" name="Rectangle 4"/>
+          <p:cNvSpPr/>
+          <p:nvPr/>
+        </p:nvSpPr>
+        <p:spPr>
+          <a:xfrm>
+            <a:off x="551810" y="12210473"/>
+            <a:ext cx="14405158" cy="4524315"/>
+          </a:xfrm>
+          <a:prstGeom prst="rect">
+            <a:avLst/>
+          </a:prstGeom>
+        </p:spPr>
+        <p:txBody>
+          <a:bodyPr wrap="square">
+            <a:spAutoFit/>
+          </a:bodyPr>
+          <a:lstStyle/>
+          <a:p>
+            <a:pPr algn="just"/>
+            <a:r>
+              <a:rPr lang="en-US" sz="4800" dirty="0">
+                <a:solidFill>
+                  <a:srgbClr val="222222"/>
+                </a:solidFill>
+                <a:latin typeface="arial" charset="0"/>
+              </a:rPr>
+              <a:t>To </a:t>
+            </a:r>
+            <a:r>
+              <a:rPr lang="en-US" sz="4800" dirty="0" smtClean="0">
+                <a:solidFill>
+                  <a:srgbClr val="222222"/>
+                </a:solidFill>
+                <a:latin typeface="arial" charset="0"/>
+              </a:rPr>
+              <a:t>come </a:t>
+            </a:r>
+            <a:r>
+              <a:rPr lang="en-US" sz="4800" dirty="0">
+                <a:solidFill>
+                  <a:srgbClr val="222222"/>
+                </a:solidFill>
+                <a:latin typeface="arial" charset="0"/>
+              </a:rPr>
+              <a:t>up with an alternative method </a:t>
+            </a:r>
+            <a:r>
+              <a:rPr lang="en-US" sz="4800" dirty="0" smtClean="0">
+                <a:solidFill>
+                  <a:srgbClr val="222222"/>
+                </a:solidFill>
+                <a:latin typeface="arial" charset="0"/>
+              </a:rPr>
+              <a:t>to matching problems, we have used </a:t>
+            </a:r>
+            <a:r>
+              <a:rPr lang="en-US" sz="4800" dirty="0">
+                <a:solidFill>
+                  <a:srgbClr val="222222"/>
+                </a:solidFill>
+                <a:latin typeface="arial" charset="0"/>
+              </a:rPr>
+              <a:t>artificial intelligence methods </a:t>
+            </a:r>
+            <a:r>
+              <a:rPr lang="en-US" sz="4800" dirty="0" smtClean="0">
+                <a:solidFill>
+                  <a:srgbClr val="222222"/>
+                </a:solidFill>
+                <a:latin typeface="arial" charset="0"/>
+              </a:rPr>
+              <a:t>on matching problems, for </a:t>
+            </a:r>
+            <a:r>
+              <a:rPr lang="en-US" sz="4800" dirty="0">
+                <a:solidFill>
+                  <a:srgbClr val="222222"/>
+                </a:solidFill>
+                <a:latin typeface="arial" charset="0"/>
+              </a:rPr>
+              <a:t>the first time in </a:t>
+            </a:r>
+            <a:r>
+              <a:rPr lang="en-US" sz="4800" dirty="0" smtClean="0">
+                <a:solidFill>
+                  <a:srgbClr val="222222"/>
+                </a:solidFill>
+                <a:latin typeface="arial" charset="0"/>
+              </a:rPr>
+              <a:t>the literature as we are aware of. In this project, we have studied one </a:t>
+            </a:r>
+            <a:r>
+              <a:rPr lang="en-US" sz="4800" dirty="0">
+                <a:solidFill>
+                  <a:srgbClr val="222222"/>
+                </a:solidFill>
+                <a:latin typeface="arial" charset="0"/>
+              </a:rPr>
+              <a:t>of the most famous matching </a:t>
+            </a:r>
+            <a:r>
+              <a:rPr lang="en-US" sz="4800" dirty="0" smtClean="0">
+                <a:solidFill>
+                  <a:srgbClr val="222222"/>
+                </a:solidFill>
+                <a:latin typeface="arial" charset="0"/>
+              </a:rPr>
+              <a:t>problems, the stable </a:t>
+            </a:r>
+            <a:r>
+              <a:rPr lang="en-US" sz="4800" dirty="0">
+                <a:solidFill>
+                  <a:srgbClr val="222222"/>
+                </a:solidFill>
+                <a:latin typeface="arial" charset="0"/>
+              </a:rPr>
+              <a:t>marriage </a:t>
+            </a:r>
+            <a:r>
+              <a:rPr lang="en-US" sz="4800" dirty="0" smtClean="0">
+                <a:solidFill>
+                  <a:srgbClr val="222222"/>
+                </a:solidFill>
+                <a:latin typeface="arial" charset="0"/>
+              </a:rPr>
+              <a:t>problem.</a:t>
+            </a:r>
+            <a:endParaRPr lang="en-US" sz="4800" dirty="0">
+              <a:solidFill>
+                <a:srgbClr val="222222"/>
+              </a:solidFill>
+              <a:latin typeface="arial" charset="0"/>
+            </a:endParaRPr>
+          </a:p>
+        </p:txBody>
+      </p:sp>
+      <mc:AlternateContent xmlns:mc="http://schemas.openxmlformats.org/markup-compatibility/2006" xmlns:a14="http://schemas.microsoft.com/office/drawing/2010/main">
+        <mc:Choice Requires="a14">
+          <p:sp>
+            <p:nvSpPr>
+              <p:cNvPr id="6" name="TextBox 5"/>
+              <p:cNvSpPr txBox="1"/>
+              <p:nvPr/>
+            </p:nvSpPr>
+            <p:spPr>
+              <a:xfrm>
+                <a:off x="551811" y="17975661"/>
+                <a:ext cx="14405158" cy="9694962"/>
+              </a:xfrm>
+              <a:prstGeom prst="rect">
+                <a:avLst/>
+              </a:prstGeom>
+              <a:noFill/>
+            </p:spPr>
+            <p:txBody>
+              <a:bodyPr wrap="square" rtlCol="0">
+                <a:spAutoFit/>
+              </a:bodyPr>
+              <a:lstStyle/>
+              <a:p>
+                <a:pPr algn="just"/>
+                <a:r>
+                  <a:rPr lang="en-US" sz="4800" dirty="0" smtClean="0"/>
+                  <a:t>Stable </a:t>
+                </a:r>
+                <a:r>
+                  <a:rPr lang="en-US" sz="4800" dirty="0"/>
+                  <a:t>marriage </a:t>
+                </a:r>
+                <a:r>
+                  <a:rPr lang="en-US" sz="4800" dirty="0" smtClean="0"/>
+                  <a:t>problem (SMP) is one of the earliest and the most famous problem in matching theory. </a:t>
+                </a:r>
+                <a:r>
+                  <a:rPr lang="en-US" sz="4800" dirty="0"/>
+                  <a:t> </a:t>
+                </a:r>
+                <a:r>
+                  <a:rPr lang="en-US" sz="4800" dirty="0" smtClean="0"/>
+                  <a:t>In SMP, the objective is to find stable marriages given a list of </a:t>
+                </a:r>
+                <a14:m>
+                  <m:oMath xmlns:m="http://schemas.openxmlformats.org/officeDocument/2006/math">
+                    <m:r>
+                      <a:rPr lang="tr-TR" sz="4800" b="0" i="1" smtClean="0">
+                        <a:latin typeface="Cambria Math" charset="0"/>
+                      </a:rPr>
+                      <m:t>𝑛</m:t>
+                    </m:r>
+                    <m:r>
+                      <a:rPr lang="tr-TR" sz="4800" b="0" i="1" smtClean="0">
+                        <a:latin typeface="Cambria Math" charset="0"/>
+                      </a:rPr>
+                      <m:t> </m:t>
+                    </m:r>
+                  </m:oMath>
+                </a14:m>
+                <a:r>
+                  <a:rPr lang="en-US" sz="4800" dirty="0" smtClean="0"/>
+                  <a:t>men and </a:t>
+                </a:r>
+                <a14:m>
+                  <m:oMath xmlns:m="http://schemas.openxmlformats.org/officeDocument/2006/math">
+                    <m:r>
+                      <a:rPr lang="tr-TR" sz="4800" i="1">
+                        <a:latin typeface="Cambria Math" charset="0"/>
+                      </a:rPr>
+                      <m:t>𝑛</m:t>
+                    </m:r>
+                    <m:r>
+                      <a:rPr lang="tr-TR" sz="4800" i="1">
+                        <a:latin typeface="Cambria Math" charset="0"/>
+                      </a:rPr>
+                      <m:t> </m:t>
+                    </m:r>
+                    <m:r>
+                      <a:rPr lang="tr-TR" sz="4800" b="0" i="0" smtClean="0">
+                        <a:latin typeface="Cambria Math" charset="0"/>
+                      </a:rPr>
+                      <m:t> </m:t>
+                    </m:r>
+                  </m:oMath>
+                </a14:m>
+                <a:r>
+                  <a:rPr lang="en-US" sz="4800" dirty="0" smtClean="0"/>
+                  <a:t>women with the complete preference lists of each men and women. </a:t>
+                </a:r>
+              </a:p>
+              <a:p>
+                <a:pPr algn="just"/>
+                <a:r>
+                  <a:rPr lang="en-US" sz="4800" dirty="0" smtClean="0"/>
+                  <a:t>In SMP, a marriage </a:t>
+                </a:r>
+                <a:r>
+                  <a:rPr lang="en-US" sz="4800" dirty="0"/>
+                  <a:t>is stable if and only if there is no</a:t>
+                </a:r>
+              </a:p>
+              <a:p>
+                <a:pPr algn="just"/>
+                <a:r>
+                  <a:rPr lang="en-US" sz="4800" dirty="0"/>
+                  <a:t>blocking pair. A blocking pair is </a:t>
+                </a:r>
+                <a:r>
+                  <a:rPr lang="en-US" sz="4800" dirty="0" smtClean="0"/>
+                  <a:t>defined as a </a:t>
+                </a:r>
+                <a:r>
+                  <a:rPr lang="en-US" sz="4800" dirty="0"/>
+                  <a:t>pair of man and woman that are not </a:t>
+                </a:r>
+                <a:r>
+                  <a:rPr lang="en-US" sz="4800" dirty="0" smtClean="0"/>
+                  <a:t>married together</a:t>
+                </a:r>
+                <a:r>
+                  <a:rPr lang="en-US" sz="4800" dirty="0"/>
+                  <a:t>, but they both prefer each other to their spouses. In case there </a:t>
+                </a:r>
+                <a:r>
+                  <a:rPr lang="en-US" sz="4800" dirty="0" smtClean="0"/>
+                  <a:t>exists a </a:t>
+                </a:r>
+                <a:r>
+                  <a:rPr lang="en-US" sz="4800" dirty="0"/>
+                  <a:t>blocking pair, this pair of man and woman would divorce from their </a:t>
+                </a:r>
+                <a:r>
+                  <a:rPr lang="en-US" sz="4800" dirty="0" smtClean="0"/>
+                  <a:t>spouses to </a:t>
+                </a:r>
+                <a:r>
+                  <a:rPr lang="en-US" sz="4800" dirty="0"/>
+                  <a:t>marry with each other, therefore the matching wouldn't be stable</a:t>
+                </a:r>
+                <a:r>
+                  <a:rPr lang="en-US" sz="4800" dirty="0" smtClean="0"/>
+                  <a:t>.</a:t>
+                </a:r>
+                <a:endParaRPr lang="en-US" sz="4800" dirty="0"/>
+              </a:p>
+            </p:txBody>
+          </p:sp>
+        </mc:Choice>
+        <mc:Fallback xmlns="">
+          <p:sp>
+            <p:nvSpPr>
+              <p:cNvPr id="6" name="TextBox 5"/>
+              <p:cNvSpPr txBox="1">
+                <a:spLocks noRot="1" noChangeAspect="1" noMove="1" noResize="1" noEditPoints="1" noAdjustHandles="1" noChangeArrowheads="1" noChangeShapeType="1" noTextEdit="1"/>
+              </p:cNvSpPr>
+              <p:nvPr/>
+            </p:nvSpPr>
+            <p:spPr>
+              <a:xfrm>
+                <a:off x="551811" y="17975661"/>
+                <a:ext cx="14405158" cy="9694962"/>
+              </a:xfrm>
+              <a:prstGeom prst="rect">
+                <a:avLst/>
+              </a:prstGeom>
+              <a:blipFill rotWithShape="0">
+                <a:blip r:embed="rId3"/>
+                <a:stretch>
+                  <a:fillRect l="-1947" t="-1509" r="-1904" b="-2327"/>
+                </a:stretch>
+              </a:blipFill>
+            </p:spPr>
+            <p:txBody>
+              <a:bodyPr/>
+              <a:lstStyle/>
+              <a:p>
+                <a:r>
+                  <a:rPr lang="en-US">
+                    <a:noFill/>
+                  </a:rPr>
+                  <a:t> </a:t>
+                </a:r>
+              </a:p>
+            </p:txBody>
+          </p:sp>
+        </mc:Fallback>
+      </mc:AlternateContent>
+      <p:pic>
+        <p:nvPicPr>
+          <p:cNvPr id="10" name="Picture 9"/>
+          <p:cNvPicPr>
+            <a:picLocks noChangeAspect="1"/>
+          </p:cNvPicPr>
+          <p:nvPr/>
+        </p:nvPicPr>
+        <p:blipFill>
+          <a:blip r:embed="rId4">
+            <a:extLst>
+              <a:ext uri="{28A0092B-C50C-407E-A947-70E740481C1C}">
+                <a14:useLocalDpi xmlns:a14="http://schemas.microsoft.com/office/drawing/2010/main" val="0"/>
+              </a:ext>
+            </a:extLst>
+          </a:blip>
+          <a:stretch>
+            <a:fillRect/>
+          </a:stretch>
+        </p:blipFill>
+        <p:spPr>
+          <a:xfrm>
+            <a:off x="551810" y="28083777"/>
+            <a:ext cx="14400844" cy="8086628"/>
+          </a:xfrm>
+          <a:prstGeom prst="rect">
+            <a:avLst/>
+          </a:prstGeom>
+        </p:spPr>
+      </p:pic>
+      <p:sp>
+        <p:nvSpPr>
+          <p:cNvPr id="11" name="TextBox 10"/>
+          <p:cNvSpPr txBox="1"/>
+          <p:nvPr/>
+        </p:nvSpPr>
+        <p:spPr>
+          <a:xfrm>
+            <a:off x="551810" y="36574080"/>
+            <a:ext cx="14400844" cy="677108"/>
+          </a:xfrm>
+          <a:prstGeom prst="rect">
+            <a:avLst/>
+          </a:prstGeom>
+          <a:noFill/>
+        </p:spPr>
+        <p:txBody>
+          <a:bodyPr wrap="square" rtlCol="0">
+            <a:spAutoFit/>
+          </a:bodyPr>
+          <a:lstStyle/>
+          <a:p>
+            <a:pPr algn="ctr"/>
+            <a:r>
+              <a:rPr lang="en-US" sz="3600" dirty="0"/>
+              <a:t>Source: https://</a:t>
+            </a:r>
+            <a:r>
+              <a:rPr lang="en-US" sz="3800" dirty="0" err="1"/>
+              <a:t>www.youtube.com</a:t>
+            </a:r>
+            <a:r>
+              <a:rPr lang="en-US" sz="3800" dirty="0"/>
+              <a:t>/</a:t>
+            </a:r>
+            <a:r>
+              <a:rPr lang="en-US" sz="3800" dirty="0" err="1"/>
+              <a:t>watch?v</a:t>
+            </a:r>
+            <a:r>
+              <a:rPr lang="en-US" sz="3800" dirty="0"/>
+              <a:t>=Dm7OQr53xKY</a:t>
+            </a:r>
+          </a:p>
+        </p:txBody>
+      </p:sp>
+      <mc:AlternateContent xmlns:mc="http://schemas.openxmlformats.org/markup-compatibility/2006" xmlns:a14="http://schemas.microsoft.com/office/drawing/2010/main">
+        <mc:Choice Requires="a14">
+          <p:sp>
+            <p:nvSpPr>
+              <p:cNvPr id="12" name="TextBox 11"/>
+              <p:cNvSpPr txBox="1"/>
+              <p:nvPr/>
+            </p:nvSpPr>
+            <p:spPr>
+              <a:xfrm>
+                <a:off x="15502759" y="6533431"/>
+                <a:ext cx="14320584" cy="10433625"/>
+              </a:xfrm>
+              <a:prstGeom prst="rect">
+                <a:avLst/>
+              </a:prstGeom>
+              <a:noFill/>
+            </p:spPr>
+            <p:txBody>
+              <a:bodyPr wrap="square" rtlCol="0">
+                <a:spAutoFit/>
+              </a:bodyPr>
+              <a:lstStyle/>
+              <a:p>
+                <a:pPr algn="just"/>
+                <a:r>
+                  <a:rPr lang="en-US" sz="4800" dirty="0" smtClean="0"/>
+                  <a:t>Stable marriage </a:t>
+                </a:r>
+                <a:r>
+                  <a:rPr lang="en-US" sz="4800" dirty="0"/>
+                  <a:t>problem with unacceptability and ties (SMPTI) is a </a:t>
+                </a:r>
+                <a:r>
+                  <a:rPr lang="en-US" sz="4800" dirty="0" smtClean="0"/>
+                  <a:t>variant of </a:t>
+                </a:r>
+                <a:r>
+                  <a:rPr lang="en-US" sz="4800" dirty="0"/>
+                  <a:t>the stable </a:t>
+                </a:r>
+                <a:r>
+                  <a:rPr lang="en-US" sz="4800" dirty="0" smtClean="0"/>
+                  <a:t>marriage problem </a:t>
+                </a:r>
+                <a:r>
+                  <a:rPr lang="en-US" sz="4800" dirty="0"/>
+                  <a:t>with a few </a:t>
+                </a:r>
+                <a:r>
+                  <a:rPr lang="en-US" sz="4800" dirty="0" smtClean="0"/>
+                  <a:t>differences. On </a:t>
+                </a:r>
+                <a:r>
+                  <a:rPr lang="en-US" sz="4800" dirty="0"/>
+                  <a:t>the contrary to an SMP instance </a:t>
+                </a:r>
+                <a:r>
+                  <a:rPr lang="en-US" sz="4800" dirty="0" smtClean="0"/>
+                  <a:t>consisting of </a:t>
+                </a:r>
+                <a14:m>
+                  <m:oMath xmlns:m="http://schemas.openxmlformats.org/officeDocument/2006/math">
+                    <m:r>
+                      <a:rPr lang="tr-TR" sz="4800" b="0" i="1" smtClean="0">
+                        <a:latin typeface="Cambria Math" charset="0"/>
+                      </a:rPr>
+                      <m:t>𝑛</m:t>
+                    </m:r>
+                  </m:oMath>
+                </a14:m>
+                <a:r>
+                  <a:rPr lang="en-US" sz="4800" dirty="0"/>
+                  <a:t> men and </a:t>
+                </a:r>
+                <a14:m>
+                  <m:oMath xmlns:m="http://schemas.openxmlformats.org/officeDocument/2006/math">
+                    <m:r>
+                      <a:rPr lang="tr-TR" sz="4800" i="1">
+                        <a:latin typeface="Cambria Math" charset="0"/>
+                      </a:rPr>
+                      <m:t>𝑛</m:t>
+                    </m:r>
+                    <m:r>
+                      <a:rPr lang="tr-TR" sz="4800" i="1">
+                        <a:latin typeface="Cambria Math" charset="0"/>
+                      </a:rPr>
+                      <m:t> </m:t>
+                    </m:r>
+                  </m:oMath>
+                </a14:m>
+                <a:r>
+                  <a:rPr lang="en-US" sz="4800" dirty="0" smtClean="0"/>
+                  <a:t> </a:t>
+                </a:r>
+                <a:r>
+                  <a:rPr lang="en-US" sz="4800" dirty="0"/>
+                  <a:t>women, </a:t>
+                </a:r>
+                <a:r>
+                  <a:rPr lang="en-US" sz="4800" dirty="0" smtClean="0"/>
+                  <a:t>SMPTI can </a:t>
+                </a:r>
+                <a:r>
+                  <a:rPr lang="en-US" sz="4800" dirty="0"/>
+                  <a:t>have </a:t>
+                </a:r>
+                <a:r>
+                  <a:rPr lang="en-US" sz="4800" dirty="0" smtClean="0"/>
+                  <a:t>different </a:t>
+                </a:r>
+                <a:r>
+                  <a:rPr lang="en-US" sz="4800" dirty="0"/>
+                  <a:t>numbers of men and women. In addition to that, in </a:t>
+                </a:r>
+                <a:r>
+                  <a:rPr lang="en-US" sz="4800" dirty="0" smtClean="0"/>
+                  <a:t>SMPTI, preferences </a:t>
+                </a:r>
+                <a:r>
+                  <a:rPr lang="en-US" sz="4800" dirty="0"/>
+                  <a:t>of men and women do not have to be complete and may include </a:t>
+                </a:r>
+                <a:r>
+                  <a:rPr lang="en-US" sz="4800" dirty="0" smtClean="0"/>
+                  <a:t>ties. As </a:t>
+                </a:r>
+                <a:r>
+                  <a:rPr lang="en-US" sz="4800" dirty="0"/>
+                  <a:t>a result of </a:t>
+                </a:r>
+                <a:r>
+                  <a:rPr lang="en-US" sz="4800" dirty="0" smtClean="0"/>
+                  <a:t>this change, </a:t>
+                </a:r>
+                <a:r>
+                  <a:rPr lang="en-US" sz="4800" dirty="0"/>
+                  <a:t>in SMPTI, </a:t>
+                </a:r>
+                <a:r>
+                  <a:rPr lang="en-US" sz="4800" dirty="0" smtClean="0"/>
+                  <a:t>men </a:t>
+                </a:r>
+                <a:r>
+                  <a:rPr lang="en-US" sz="4800" dirty="0"/>
+                  <a:t>and </a:t>
+                </a:r>
+                <a:r>
+                  <a:rPr lang="en-US" sz="4800" dirty="0" smtClean="0"/>
+                  <a:t>women may </a:t>
+                </a:r>
+                <a:r>
+                  <a:rPr lang="en-US" sz="4800" dirty="0"/>
+                  <a:t>be </a:t>
+                </a:r>
+                <a:r>
+                  <a:rPr lang="en-US" sz="4800" dirty="0" smtClean="0"/>
+                  <a:t>single.</a:t>
+                </a:r>
+                <a:endParaRPr lang="en-US" sz="4800" dirty="0"/>
+              </a:p>
+              <a:p>
+                <a:pPr algn="just"/>
+                <a:r>
+                  <a:rPr lang="en-US" sz="4800" dirty="0" smtClean="0"/>
+                  <a:t>In SMPTI, a pair of man and woman are said to form </a:t>
+                </a:r>
+                <a:r>
+                  <a:rPr lang="en-US" sz="4800" dirty="0"/>
+                  <a:t>a blocking pair </a:t>
+                </a:r>
+                <a:r>
+                  <a:rPr lang="en-US" sz="4800" dirty="0" smtClean="0"/>
+                  <a:t>they are not married and each of them is either single and finds the other one acceptable, or  married and prefers the other one to his/her actual partner.</a:t>
+                </a:r>
+                <a:endParaRPr lang="en-US" sz="4800" dirty="0"/>
+              </a:p>
+            </p:txBody>
+          </p:sp>
+        </mc:Choice>
+        <mc:Fallback xmlns="">
+          <p:sp>
+            <p:nvSpPr>
+              <p:cNvPr id="12" name="TextBox 11"/>
+              <p:cNvSpPr txBox="1">
+                <a:spLocks noRot="1" noChangeAspect="1" noMove="1" noResize="1" noEditPoints="1" noAdjustHandles="1" noChangeArrowheads="1" noChangeShapeType="1" noTextEdit="1"/>
+              </p:cNvSpPr>
+              <p:nvPr/>
+            </p:nvSpPr>
+            <p:spPr>
+              <a:xfrm>
+                <a:off x="15502759" y="6533431"/>
+                <a:ext cx="14320584" cy="10433625"/>
+              </a:xfrm>
+              <a:prstGeom prst="rect">
+                <a:avLst/>
+              </a:prstGeom>
+              <a:blipFill rotWithShape="0">
+                <a:blip r:embed="rId5"/>
+                <a:stretch>
+                  <a:fillRect l="-1916" t="-1403" r="-1958" b="-2104"/>
+                </a:stretch>
+              </a:blipFill>
+            </p:spPr>
+            <p:txBody>
+              <a:bodyPr/>
+              <a:lstStyle/>
+              <a:p>
+                <a:r>
+                  <a:rPr lang="en-US">
+                    <a:noFill/>
+                  </a:rPr>
+                  <a:t> </a:t>
+                </a:r>
+              </a:p>
+            </p:txBody>
+          </p:sp>
+        </mc:Fallback>
+      </mc:AlternateContent>
+      <mc:AlternateContent xmlns:mc="http://schemas.openxmlformats.org/markup-compatibility/2006">
+        <mc:Choice xmlns:a14="http://schemas.microsoft.com/office/drawing/2010/main" Requires="a14">
+          <p:sp>
+            <p:nvSpPr>
+              <p:cNvPr id="13" name="TextBox 12"/>
+              <p:cNvSpPr txBox="1"/>
+              <p:nvPr/>
+            </p:nvSpPr>
+            <p:spPr>
+              <a:xfrm>
+                <a:off x="15498443" y="17972921"/>
+                <a:ext cx="14324900" cy="11990398"/>
+              </a:xfrm>
+              <a:prstGeom prst="rect">
+                <a:avLst/>
+              </a:prstGeom>
+              <a:noFill/>
+            </p:spPr>
+            <p:txBody>
+              <a:bodyPr wrap="square" rtlCol="0">
+                <a:spAutoFit/>
+              </a:bodyPr>
+              <a:lstStyle/>
+              <a:p>
+                <a:pPr algn="just"/>
+                <a:r>
+                  <a:rPr lang="en-US" sz="4800" dirty="0" smtClean="0"/>
+                  <a:t>Optimization is making the most effective use of a situation or resource. While solving SMP, </a:t>
+                </a:r>
+                <a:r>
+                  <a:rPr lang="en-US" sz="4800" dirty="0"/>
+                  <a:t>we </a:t>
+                </a:r>
+                <a:r>
+                  <a:rPr lang="en-US" sz="4800" dirty="0" smtClean="0"/>
+                  <a:t>have used </a:t>
+                </a:r>
+                <a:r>
+                  <a:rPr lang="en-US" sz="4800" dirty="0"/>
+                  <a:t>optimization to get the </a:t>
+                </a:r>
+                <a:r>
+                  <a:rPr lang="en-US" sz="4800" dirty="0" smtClean="0"/>
+                  <a:t>most effective answer set among all stable marriages. In this optimization process, we have used 3 different cost function.</a:t>
+                </a:r>
+              </a:p>
+              <a:p>
+                <a:pPr algn="just"/>
+                <a:r>
+                  <a:rPr lang="en-US" sz="4800" dirty="0" smtClean="0"/>
+                  <a:t>Let us define </a:t>
+                </a:r>
+                <a14:m>
+                  <m:oMath xmlns:m="http://schemas.openxmlformats.org/officeDocument/2006/math">
+                    <m:sSub>
+                      <m:sSubPr>
+                        <m:ctrlPr>
+                          <a:rPr lang="en-US" sz="4800" b="0" i="1" smtClean="0">
+                            <a:latin typeface="Cambria Math" charset="0"/>
+                          </a:rPr>
+                        </m:ctrlPr>
+                      </m:sSubPr>
+                      <m:e>
+                        <m:r>
+                          <a:rPr lang="tr-TR" sz="4800" b="0" i="1" smtClean="0">
+                            <a:latin typeface="Cambria Math" charset="0"/>
+                          </a:rPr>
+                          <m:t>𝐶</m:t>
+                        </m:r>
+                      </m:e>
+                      <m:sub>
+                        <m:r>
+                          <a:rPr lang="tr-TR" sz="4800" b="0" i="1" smtClean="0">
+                            <a:latin typeface="Cambria Math" charset="0"/>
+                          </a:rPr>
+                          <m:t>𝑖</m:t>
+                        </m:r>
+                      </m:sub>
+                    </m:sSub>
+                    <m:r>
+                      <a:rPr lang="tr-TR" sz="4800" b="0" i="1" smtClean="0">
+                        <a:latin typeface="Cambria Math" charset="0"/>
+                      </a:rPr>
+                      <m:t>(</m:t>
+                    </m:r>
+                    <m:r>
+                      <a:rPr lang="tr-TR" sz="4800" b="0" i="1" smtClean="0">
+                        <a:latin typeface="Cambria Math" charset="0"/>
+                      </a:rPr>
+                      <m:t>𝑆</m:t>
+                    </m:r>
+                    <m:r>
+                      <a:rPr lang="tr-TR" sz="4800" b="0" i="1" smtClean="0">
+                        <a:latin typeface="Cambria Math" charset="0"/>
+                      </a:rPr>
+                      <m:t>)=</m:t>
+                    </m:r>
+                    <m:r>
+                      <a:rPr lang="tr-TR" sz="4800" b="0" i="1" smtClean="0">
+                        <a:latin typeface="Cambria Math" charset="0"/>
+                      </a:rPr>
+                      <m:t>𝑘</m:t>
+                    </m:r>
+                  </m:oMath>
+                </a14:m>
+                <a:r>
+                  <a:rPr lang="en-US" sz="4800" dirty="0" smtClean="0"/>
+                  <a:t> when agent </a:t>
+                </a:r>
+                <a14:m>
+                  <m:oMath xmlns:m="http://schemas.openxmlformats.org/officeDocument/2006/math">
+                    <m:r>
+                      <a:rPr lang="tr-TR" sz="4800" b="0" i="1" smtClean="0">
+                        <a:latin typeface="Cambria Math" charset="0"/>
+                      </a:rPr>
+                      <m:t>𝑖</m:t>
+                    </m:r>
+                  </m:oMath>
+                </a14:m>
+                <a:r>
+                  <a:rPr lang="en-US" sz="4800" dirty="0" smtClean="0"/>
+                  <a:t> is matched with his/her </a:t>
+                </a:r>
+                <a14:m>
+                  <m:oMath xmlns:m="http://schemas.openxmlformats.org/officeDocument/2006/math">
+                    <m:sSup>
+                      <m:sSupPr>
+                        <m:ctrlPr>
+                          <a:rPr lang="en-US" sz="4800" i="1" smtClean="0">
+                            <a:latin typeface="Cambria Math" charset="0"/>
+                          </a:rPr>
+                        </m:ctrlPr>
+                      </m:sSupPr>
+                      <m:e>
+                        <m:r>
+                          <a:rPr lang="tr-TR" sz="4800" b="0" i="1" smtClean="0">
+                            <a:latin typeface="Cambria Math" charset="0"/>
+                          </a:rPr>
+                          <m:t>𝑘</m:t>
+                        </m:r>
+                      </m:e>
+                      <m:sup>
+                        <m:r>
+                          <a:rPr lang="tr-TR" sz="4800" b="0" i="1" smtClean="0">
+                            <a:latin typeface="Cambria Math" charset="0"/>
+                          </a:rPr>
+                          <m:t>𝑡h</m:t>
+                        </m:r>
+                      </m:sup>
+                    </m:sSup>
+                  </m:oMath>
+                </a14:m>
+                <a:r>
+                  <a:rPr lang="en-US" sz="4800" dirty="0" smtClean="0"/>
+                  <a:t> preference in the stable marriage </a:t>
+                </a:r>
+                <a14:m>
+                  <m:oMath xmlns:m="http://schemas.openxmlformats.org/officeDocument/2006/math">
+                    <m:r>
+                      <a:rPr lang="tr-TR" sz="4800" b="0" i="1" smtClean="0">
+                        <a:latin typeface="Cambria Math" charset="0"/>
+                      </a:rPr>
+                      <m:t>𝑆</m:t>
+                    </m:r>
+                  </m:oMath>
+                </a14:m>
+                <a:r>
+                  <a:rPr lang="en-US" sz="4800" dirty="0" smtClean="0"/>
+                  <a:t>.</a:t>
+                </a:r>
+              </a:p>
+              <a:p>
+                <a:pPr algn="just"/>
+                <a:r>
+                  <a:rPr lang="en-US" sz="4800" dirty="0" smtClean="0"/>
+                  <a:t>Egalitarian SMPTI minimizes the cost function</a:t>
+                </a:r>
+              </a:p>
+              <a:p>
+                <a:pPr algn="just"/>
+                <a14:m>
+                  <m:oMathPara xmlns:m="http://schemas.openxmlformats.org/officeDocument/2006/math">
+                    <m:oMathParaPr>
+                      <m:jc m:val="centerGroup"/>
+                    </m:oMathParaPr>
+                    <m:oMath xmlns:m="http://schemas.openxmlformats.org/officeDocument/2006/math">
+                      <m:r>
+                        <a:rPr lang="tr-TR" sz="4800" b="0" i="1" smtClean="0">
+                          <a:latin typeface="Cambria Math" charset="0"/>
+                        </a:rPr>
+                        <m:t>𝐶</m:t>
+                      </m:r>
+                      <m:d>
+                        <m:dPr>
+                          <m:ctrlPr>
+                            <a:rPr lang="tr-TR" sz="4800" b="0" i="1" smtClean="0">
+                              <a:latin typeface="Cambria Math" charset="0"/>
+                            </a:rPr>
+                          </m:ctrlPr>
+                        </m:dPr>
+                        <m:e>
+                          <m:r>
+                            <a:rPr lang="tr-TR" sz="4800" b="0" i="1" smtClean="0">
+                              <a:latin typeface="Cambria Math" charset="0"/>
+                            </a:rPr>
+                            <m:t>𝑆</m:t>
+                          </m:r>
+                        </m:e>
+                      </m:d>
+                      <m:r>
+                        <a:rPr lang="tr-TR" sz="4800" b="0" i="1" smtClean="0">
+                          <a:latin typeface="Cambria Math" charset="0"/>
+                        </a:rPr>
+                        <m:t>= </m:t>
+                      </m:r>
+                      <m:d>
+                        <m:dPr>
+                          <m:begChr m:val="|"/>
+                          <m:endChr m:val="|"/>
+                          <m:ctrlPr>
+                            <a:rPr lang="hr-HR" sz="4800" b="0" i="1" smtClean="0">
+                              <a:latin typeface="Cambria Math" charset="0"/>
+                            </a:rPr>
+                          </m:ctrlPr>
+                        </m:dPr>
+                        <m:e>
+                          <m:nary>
+                            <m:naryPr>
+                              <m:chr m:val="∑"/>
+                              <m:supHide m:val="on"/>
+                              <m:ctrlPr>
+                                <a:rPr lang="hr-HR" sz="4800" b="0" i="1" smtClean="0">
+                                  <a:latin typeface="Cambria Math" charset="0"/>
+                                </a:rPr>
+                              </m:ctrlPr>
+                            </m:naryPr>
+                            <m:sub>
+                              <m:r>
+                                <m:rPr>
+                                  <m:brk m:alnAt="7"/>
+                                </m:rPr>
+                                <a:rPr lang="tr-TR" sz="4800" b="0" i="1" smtClean="0">
+                                  <a:latin typeface="Cambria Math" charset="0"/>
+                                </a:rPr>
+                                <m:t>𝑖</m:t>
+                              </m:r>
+                              <m:r>
+                                <a:rPr lang="tr-TR" sz="4800" b="0" i="1" smtClean="0">
+                                  <a:latin typeface="Cambria Math" charset="0"/>
+                                </a:rPr>
+                                <m:t> ∈</m:t>
+                              </m:r>
+                              <m:r>
+                                <a:rPr lang="tr-TR" sz="4800" b="0" i="1" smtClean="0">
+                                  <a:latin typeface="Cambria Math" charset="0"/>
+                                  <a:ea typeface="Cambria Math" charset="0"/>
+                                  <a:cs typeface="Cambria Math" charset="0"/>
+                                </a:rPr>
+                                <m:t>𝑀</m:t>
+                              </m:r>
+                            </m:sub>
+                            <m:sup/>
+                            <m:e>
+                              <m:sSub>
+                                <m:sSubPr>
+                                  <m:ctrlPr>
+                                    <a:rPr lang="en-US" sz="4800" b="0" i="1" smtClean="0">
+                                      <a:latin typeface="Cambria Math" charset="0"/>
+                                    </a:rPr>
+                                  </m:ctrlPr>
+                                </m:sSubPr>
+                                <m:e>
+                                  <m:r>
+                                    <a:rPr lang="tr-TR" sz="4800" b="0" i="1" smtClean="0">
+                                      <a:latin typeface="Cambria Math" charset="0"/>
+                                    </a:rPr>
+                                    <m:t>𝐶</m:t>
+                                  </m:r>
+                                </m:e>
+                                <m:sub>
+                                  <m:r>
+                                    <a:rPr lang="tr-TR" sz="4800" b="0" i="1" smtClean="0">
+                                      <a:latin typeface="Cambria Math" charset="0"/>
+                                    </a:rPr>
+                                    <m:t>𝑖</m:t>
+                                  </m:r>
+                                </m:sub>
+                              </m:sSub>
+                              <m:d>
+                                <m:dPr>
+                                  <m:ctrlPr>
+                                    <a:rPr lang="tr-TR" sz="4800" b="0" i="1" smtClean="0">
+                                      <a:latin typeface="Cambria Math" charset="0"/>
+                                    </a:rPr>
+                                  </m:ctrlPr>
+                                </m:dPr>
+                                <m:e>
+                                  <m:r>
+                                    <a:rPr lang="tr-TR" sz="4800" b="0" i="1" smtClean="0">
+                                      <a:latin typeface="Cambria Math" charset="0"/>
+                                    </a:rPr>
+                                    <m:t>𝑆</m:t>
+                                  </m:r>
+                                </m:e>
+                              </m:d>
+                              <m:r>
+                                <a:rPr lang="tr-TR" sz="4800" b="0" i="1" smtClean="0">
+                                  <a:latin typeface="Cambria Math" charset="0"/>
+                                </a:rPr>
+                                <m:t>− </m:t>
+                              </m:r>
+                              <m:nary>
+                                <m:naryPr>
+                                  <m:chr m:val="∑"/>
+                                  <m:supHide m:val="on"/>
+                                  <m:ctrlPr>
+                                    <a:rPr lang="tr-TR" sz="4800" b="0" i="1" smtClean="0">
+                                      <a:latin typeface="Cambria Math" charset="0"/>
+                                    </a:rPr>
+                                  </m:ctrlPr>
+                                </m:naryPr>
+                                <m:sub>
+                                  <m:r>
+                                    <m:rPr>
+                                      <m:brk m:alnAt="7"/>
+                                    </m:rPr>
+                                    <a:rPr lang="tr-TR" sz="4800" b="0" i="1" smtClean="0">
+                                      <a:latin typeface="Cambria Math" charset="0"/>
+                                    </a:rPr>
+                                    <m:t>𝑖</m:t>
+                                  </m:r>
+                                  <m:r>
+                                    <a:rPr lang="tr-TR" sz="4800" b="0" i="1" smtClean="0">
+                                      <a:latin typeface="Cambria Math" charset="0"/>
+                                    </a:rPr>
+                                    <m:t> ∈</m:t>
+                                  </m:r>
+                                  <m:r>
+                                    <a:rPr lang="tr-TR" sz="4800" b="0" i="1" smtClean="0">
+                                      <a:latin typeface="Cambria Math" charset="0"/>
+                                      <a:ea typeface="Cambria Math" charset="0"/>
+                                      <a:cs typeface="Cambria Math" charset="0"/>
+                                    </a:rPr>
+                                    <m:t>𝑊</m:t>
+                                  </m:r>
+                                </m:sub>
+                                <m:sup/>
+                                <m:e>
+                                  <m:sSub>
+                                    <m:sSubPr>
+                                      <m:ctrlPr>
+                                        <a:rPr lang="en-US" sz="4800" b="0" i="1" smtClean="0">
+                                          <a:latin typeface="Cambria Math" charset="0"/>
+                                        </a:rPr>
+                                      </m:ctrlPr>
+                                    </m:sSubPr>
+                                    <m:e>
+                                      <m:r>
+                                        <a:rPr lang="tr-TR" sz="4800" b="0" i="1" smtClean="0">
+                                          <a:latin typeface="Cambria Math" charset="0"/>
+                                        </a:rPr>
+                                        <m:t>𝐶</m:t>
+                                      </m:r>
+                                    </m:e>
+                                    <m:sub>
+                                      <m:r>
+                                        <a:rPr lang="tr-TR" sz="4800" b="0" i="1" smtClean="0">
+                                          <a:latin typeface="Cambria Math" charset="0"/>
+                                        </a:rPr>
+                                        <m:t>𝑖</m:t>
+                                      </m:r>
+                                    </m:sub>
+                                  </m:sSub>
+                                  <m:r>
+                                    <a:rPr lang="tr-TR" sz="4800" b="0" i="1" smtClean="0">
+                                      <a:latin typeface="Cambria Math" charset="0"/>
+                                    </a:rPr>
+                                    <m:t>(</m:t>
+                                  </m:r>
+                                  <m:r>
+                                    <a:rPr lang="tr-TR" sz="4800" b="0" i="1" smtClean="0">
+                                      <a:latin typeface="Cambria Math" charset="0"/>
+                                    </a:rPr>
+                                    <m:t>𝑆</m:t>
+                                  </m:r>
+                                  <m:r>
+                                    <a:rPr lang="tr-TR" sz="4800" b="0" i="1" smtClean="0">
+                                      <a:latin typeface="Cambria Math" charset="0"/>
+                                    </a:rPr>
+                                    <m:t>)</m:t>
+                                  </m:r>
+                                </m:e>
+                              </m:nary>
+                            </m:e>
+                          </m:nary>
+                        </m:e>
+                      </m:d>
+                    </m:oMath>
+                  </m:oMathPara>
+                </a14:m>
+                <a:endParaRPr lang="en-US" sz="4800" dirty="0" smtClean="0"/>
+              </a:p>
+              <a:p>
+                <a:pPr algn="just"/>
+                <a:r>
+                  <a:rPr lang="en-US" sz="4800" dirty="0" smtClean="0"/>
+                  <a:t>Sex equal SMPTI minimizes the cost function</a:t>
+                </a:r>
+              </a:p>
+              <a:p>
+                <a:pPr algn="just"/>
+                <a14:m>
+                  <m:oMathPara xmlns:m="http://schemas.openxmlformats.org/officeDocument/2006/math">
+                    <m:oMathParaPr>
+                      <m:jc m:val="centerGroup"/>
+                    </m:oMathParaPr>
+                    <m:oMath xmlns:m="http://schemas.openxmlformats.org/officeDocument/2006/math">
+                      <m:r>
+                        <a:rPr lang="tr-TR" sz="4800" i="1" smtClean="0">
+                          <a:latin typeface="Cambria Math" charset="0"/>
+                        </a:rPr>
+                        <m:t>𝐶</m:t>
+                      </m:r>
+                      <m:d>
+                        <m:dPr>
+                          <m:ctrlPr>
+                            <a:rPr lang="tr-TR" sz="4800" i="1">
+                              <a:latin typeface="Cambria Math" charset="0"/>
+                            </a:rPr>
+                          </m:ctrlPr>
+                        </m:dPr>
+                        <m:e>
+                          <m:r>
+                            <a:rPr lang="tr-TR" sz="4800" i="1">
+                              <a:latin typeface="Cambria Math" charset="0"/>
+                            </a:rPr>
+                            <m:t>𝑆</m:t>
+                          </m:r>
+                        </m:e>
+                      </m:d>
+                      <m:r>
+                        <a:rPr lang="tr-TR" sz="4800" b="0" i="1" smtClean="0">
+                          <a:latin typeface="Cambria Math" charset="0"/>
+                        </a:rPr>
+                        <m:t>= </m:t>
+                      </m:r>
+                      <m:nary>
+                        <m:naryPr>
+                          <m:chr m:val="∑"/>
+                          <m:supHide m:val="on"/>
+                          <m:ctrlPr>
+                            <a:rPr lang="tr-TR" sz="4800" b="0" i="1" smtClean="0">
+                              <a:latin typeface="Cambria Math" charset="0"/>
+                            </a:rPr>
+                          </m:ctrlPr>
+                        </m:naryPr>
+                        <m:sub>
+                          <m:r>
+                            <m:rPr>
+                              <m:brk m:alnAt="7"/>
+                            </m:rPr>
+                            <a:rPr lang="tr-TR" sz="4800" b="0" i="1" smtClean="0">
+                              <a:latin typeface="Cambria Math" charset="0"/>
+                            </a:rPr>
+                            <m:t>𝑖</m:t>
+                          </m:r>
+                          <m:r>
+                            <a:rPr lang="tr-TR" sz="4800" b="0" i="1" smtClean="0">
+                              <a:latin typeface="Cambria Math" charset="0"/>
+                            </a:rPr>
+                            <m:t> ∈</m:t>
+                          </m:r>
+                          <m:r>
+                            <a:rPr lang="tr-TR" sz="4800" b="0" i="1" smtClean="0">
+                              <a:latin typeface="Cambria Math" charset="0"/>
+                              <a:ea typeface="Cambria Math" charset="0"/>
+                              <a:cs typeface="Cambria Math" charset="0"/>
+                            </a:rPr>
+                            <m:t>𝑀</m:t>
+                          </m:r>
+                        </m:sub>
+                        <m:sup/>
+                        <m:e>
+                          <m:sSub>
+                            <m:sSubPr>
+                              <m:ctrlPr>
+                                <a:rPr lang="en-US" sz="4800" b="0" i="1" smtClean="0">
+                                  <a:latin typeface="Cambria Math" charset="0"/>
+                                </a:rPr>
+                              </m:ctrlPr>
+                            </m:sSubPr>
+                            <m:e>
+                              <m:r>
+                                <a:rPr lang="tr-TR" sz="4800" b="0" i="1" smtClean="0">
+                                  <a:latin typeface="Cambria Math" charset="0"/>
+                                </a:rPr>
+                                <m:t>𝐶</m:t>
+                              </m:r>
+                            </m:e>
+                            <m:sub>
+                              <m:r>
+                                <a:rPr lang="tr-TR" sz="4800" b="0" i="1" smtClean="0">
+                                  <a:latin typeface="Cambria Math" charset="0"/>
+                                </a:rPr>
+                                <m:t>𝑖</m:t>
+                              </m:r>
+                            </m:sub>
+                          </m:sSub>
+                          <m:r>
+                            <a:rPr lang="tr-TR" sz="4800" b="0" i="1" smtClean="0">
+                              <a:latin typeface="Cambria Math" charset="0"/>
+                            </a:rPr>
+                            <m:t>(</m:t>
+                          </m:r>
+                          <m:r>
+                            <a:rPr lang="tr-TR" sz="4800" b="0" i="1" smtClean="0">
+                              <a:latin typeface="Cambria Math" charset="0"/>
+                            </a:rPr>
+                            <m:t>𝑆</m:t>
+                          </m:r>
+                          <m:r>
+                            <a:rPr lang="tr-TR" sz="4800" b="0" i="1" smtClean="0">
+                              <a:latin typeface="Cambria Math" charset="0"/>
+                            </a:rPr>
+                            <m:t>)</m:t>
+                          </m:r>
+                        </m:e>
+                      </m:nary>
+                      <m:r>
+                        <a:rPr lang="tr-TR" sz="4800" b="0" i="1" smtClean="0">
+                          <a:latin typeface="Cambria Math" charset="0"/>
+                        </a:rPr>
+                        <m:t>+ </m:t>
+                      </m:r>
+                      <m:nary>
+                        <m:naryPr>
+                          <m:chr m:val="∑"/>
+                          <m:supHide m:val="on"/>
+                          <m:ctrlPr>
+                            <a:rPr lang="tr-TR" sz="4800" b="0" i="1" smtClean="0">
+                              <a:latin typeface="Cambria Math" charset="0"/>
+                            </a:rPr>
+                          </m:ctrlPr>
+                        </m:naryPr>
+                        <m:sub>
+                          <m:r>
+                            <m:rPr>
+                              <m:brk m:alnAt="7"/>
+                            </m:rPr>
+                            <a:rPr lang="tr-TR" sz="4800" b="0" i="1" smtClean="0">
+                              <a:latin typeface="Cambria Math" charset="0"/>
+                            </a:rPr>
+                            <m:t>𝑖</m:t>
+                          </m:r>
+                          <m:r>
+                            <a:rPr lang="tr-TR" sz="4800" b="0" i="1" smtClean="0">
+                              <a:latin typeface="Cambria Math" charset="0"/>
+                            </a:rPr>
+                            <m:t> ∈</m:t>
+                          </m:r>
+                          <m:r>
+                            <a:rPr lang="tr-TR" sz="4800" b="0" i="1" smtClean="0">
+                              <a:latin typeface="Cambria Math" charset="0"/>
+                              <a:ea typeface="Cambria Math" charset="0"/>
+                              <a:cs typeface="Cambria Math" charset="0"/>
+                            </a:rPr>
+                            <m:t>𝑊</m:t>
+                          </m:r>
+                        </m:sub>
+                        <m:sup/>
+                        <m:e>
+                          <m:sSub>
+                            <m:sSubPr>
+                              <m:ctrlPr>
+                                <a:rPr lang="en-US" sz="4800" b="0" i="1" smtClean="0">
+                                  <a:latin typeface="Cambria Math" charset="0"/>
+                                </a:rPr>
+                              </m:ctrlPr>
+                            </m:sSubPr>
+                            <m:e>
+                              <m:r>
+                                <a:rPr lang="tr-TR" sz="4800" b="0" i="1" smtClean="0">
+                                  <a:latin typeface="Cambria Math" charset="0"/>
+                                </a:rPr>
+                                <m:t>𝐶</m:t>
+                              </m:r>
+                            </m:e>
+                            <m:sub>
+                              <m:r>
+                                <a:rPr lang="tr-TR" sz="4800" b="0" i="1" smtClean="0">
+                                  <a:latin typeface="Cambria Math" charset="0"/>
+                                </a:rPr>
+                                <m:t>𝑖</m:t>
+                              </m:r>
+                            </m:sub>
+                          </m:sSub>
+                          <m:r>
+                            <a:rPr lang="en-US" sz="4800" b="0" i="1" smtClean="0">
+                              <a:latin typeface="Cambria Math" charset="0"/>
+                            </a:rPr>
+                            <m:t> </m:t>
+                          </m:r>
+                          <m:r>
+                            <a:rPr lang="tr-TR" sz="4800" b="0" i="1" smtClean="0">
+                              <a:latin typeface="Cambria Math" charset="0"/>
+                            </a:rPr>
+                            <m:t>(</m:t>
+                          </m:r>
+                          <m:r>
+                            <a:rPr lang="tr-TR" sz="4800" b="0" i="1" smtClean="0">
+                              <a:latin typeface="Cambria Math" charset="0"/>
+                            </a:rPr>
+                            <m:t>𝑆</m:t>
+                          </m:r>
+                          <m:r>
+                            <a:rPr lang="tr-TR" sz="4800" b="0" i="1" smtClean="0">
+                              <a:latin typeface="Cambria Math" charset="0"/>
+                            </a:rPr>
+                            <m:t>)</m:t>
+                          </m:r>
+                        </m:e>
+                      </m:nary>
+                      <m:r>
+                        <a:rPr lang="tr-TR" sz="4800" b="0" i="1" smtClean="0">
+                          <a:latin typeface="Cambria Math" charset="0"/>
+                        </a:rPr>
+                        <m:t> </m:t>
+                      </m:r>
+                    </m:oMath>
+                  </m:oMathPara>
+                </a14:m>
+                <a:endParaRPr lang="en-US" sz="4800" dirty="0"/>
+              </a:p>
+              <a:p>
+                <a:pPr algn="just"/>
+                <a:r>
+                  <a:rPr lang="en-US" sz="4800" dirty="0" smtClean="0"/>
+                  <a:t>Minimum regret SMPTI minimizes the cost function</a:t>
+                </a:r>
+              </a:p>
+              <a:p>
+                <a:pPr algn="just"/>
+                <a14:m>
+                  <m:oMathPara xmlns:m="http://schemas.openxmlformats.org/officeDocument/2006/math">
+                    <m:oMathParaPr>
+                      <m:jc m:val="centerGroup"/>
+                    </m:oMathParaPr>
+                    <m:oMath xmlns:m="http://schemas.openxmlformats.org/officeDocument/2006/math">
+                      <m:r>
+                        <a:rPr lang="tr-TR" sz="4800" b="0" i="1" smtClean="0">
+                          <a:latin typeface="Cambria Math" charset="0"/>
+                        </a:rPr>
+                        <m:t>𝐶</m:t>
+                      </m:r>
+                      <m:d>
+                        <m:dPr>
+                          <m:ctrlPr>
+                            <a:rPr lang="tr-TR" sz="4800" b="0" i="1" smtClean="0">
+                              <a:latin typeface="Cambria Math" charset="0"/>
+                            </a:rPr>
+                          </m:ctrlPr>
+                        </m:dPr>
+                        <m:e>
+                          <m:r>
+                            <a:rPr lang="tr-TR" sz="4800" b="0" i="1" smtClean="0">
+                              <a:latin typeface="Cambria Math" charset="0"/>
+                            </a:rPr>
+                            <m:t>𝑆</m:t>
+                          </m:r>
+                        </m:e>
+                      </m:d>
+                      <m:r>
+                        <a:rPr lang="tr-TR" sz="4800" b="0" i="1" smtClean="0">
+                          <a:latin typeface="Cambria Math" charset="0"/>
+                        </a:rPr>
+                        <m:t>=</m:t>
+                      </m:r>
+                      <m:r>
+                        <a:rPr lang="tr-TR" sz="4800" b="0" i="1" smtClean="0">
+                          <a:latin typeface="Cambria Math" charset="0"/>
+                        </a:rPr>
+                        <m:t>𝑚𝑎𝑥</m:t>
+                      </m:r>
+                      <m:sSub>
+                        <m:sSubPr>
+                          <m:ctrlPr>
+                            <a:rPr lang="en-US" sz="4800" b="0" i="1" smtClean="0">
+                              <a:latin typeface="Cambria Math" charset="0"/>
+                            </a:rPr>
+                          </m:ctrlPr>
+                        </m:sSubPr>
+                        <m:e>
+                          <m:d>
+                            <m:dPr>
+                              <m:begChr m:val="{"/>
+                              <m:endChr m:val="}"/>
+                              <m:ctrlPr>
+                                <a:rPr lang="en-US" sz="4800" b="0" i="1" smtClean="0">
+                                  <a:latin typeface="Cambria Math" charset="0"/>
+                                </a:rPr>
+                              </m:ctrlPr>
+                            </m:dPr>
+                            <m:e>
+                              <m:sSub>
+                                <m:sSubPr>
+                                  <m:ctrlPr>
+                                    <a:rPr lang="en-US" sz="4800" b="0" i="1" smtClean="0">
+                                      <a:latin typeface="Cambria Math" charset="0"/>
+                                    </a:rPr>
+                                  </m:ctrlPr>
+                                </m:sSubPr>
+                                <m:e>
+                                  <m:r>
+                                    <a:rPr lang="tr-TR" sz="4800" b="0" i="1" smtClean="0">
+                                      <a:latin typeface="Cambria Math" charset="0"/>
+                                    </a:rPr>
+                                    <m:t>𝐶</m:t>
+                                  </m:r>
+                                </m:e>
+                                <m:sub>
+                                  <m:r>
+                                    <a:rPr lang="tr-TR" sz="4800" b="0" i="1" smtClean="0">
+                                      <a:latin typeface="Cambria Math" charset="0"/>
+                                    </a:rPr>
+                                    <m:t>𝑖</m:t>
+                                  </m:r>
+                                </m:sub>
+                              </m:sSub>
+                              <m:r>
+                                <a:rPr lang="tr-TR" sz="4800" b="0" i="1" smtClean="0">
+                                  <a:latin typeface="Cambria Math" charset="0"/>
+                                </a:rPr>
+                                <m:t>(</m:t>
+                              </m:r>
+                              <m:r>
+                                <a:rPr lang="tr-TR" sz="4800" b="0" i="1" smtClean="0">
+                                  <a:latin typeface="Cambria Math" charset="0"/>
+                                </a:rPr>
+                                <m:t>𝑆</m:t>
+                              </m:r>
+                              <m:r>
+                                <a:rPr lang="tr-TR" sz="4800" b="0" i="1" smtClean="0">
+                                  <a:latin typeface="Cambria Math" charset="0"/>
+                                </a:rPr>
+                                <m:t>)</m:t>
+                              </m:r>
+                            </m:e>
+                          </m:d>
+                        </m:e>
+                        <m:sub>
+                          <m:r>
+                            <a:rPr lang="tr-TR" sz="4800" b="0" i="1" smtClean="0">
+                              <a:latin typeface="Cambria Math" charset="0"/>
+                            </a:rPr>
+                            <m:t>𝑖</m:t>
+                          </m:r>
+                          <m:r>
+                            <a:rPr lang="tr-TR" sz="4800" b="0" i="1" smtClean="0">
+                              <a:latin typeface="Cambria Math" charset="0"/>
+                            </a:rPr>
+                            <m:t> ∈</m:t>
+                          </m:r>
+                          <m:r>
+                            <a:rPr lang="tr-TR" sz="4800" b="0" i="1" smtClean="0">
+                              <a:latin typeface="Cambria Math" charset="0"/>
+                              <a:ea typeface="Cambria Math" charset="0"/>
+                              <a:cs typeface="Cambria Math" charset="0"/>
+                            </a:rPr>
+                            <m:t>𝑀</m:t>
+                          </m:r>
+                          <m:r>
+                            <a:rPr lang="tr-TR" sz="4800" b="0" i="1" smtClean="0">
+                              <a:latin typeface="Cambria Math" charset="0"/>
+                              <a:ea typeface="Cambria Math" charset="0"/>
+                              <a:cs typeface="Cambria Math" charset="0"/>
+                            </a:rPr>
+                            <m:t>∪</m:t>
+                          </m:r>
+                          <m:r>
+                            <a:rPr lang="tr-TR" sz="4800" b="0" i="1" smtClean="0">
+                              <a:latin typeface="Cambria Math" charset="0"/>
+                              <a:ea typeface="Cambria Math" charset="0"/>
+                              <a:cs typeface="Cambria Math" charset="0"/>
+                            </a:rPr>
+                            <m:t>𝑊</m:t>
+                          </m:r>
+                        </m:sub>
+                      </m:sSub>
+                    </m:oMath>
+                  </m:oMathPara>
+                </a14:m>
+                <a:endParaRPr lang="en-US" sz="4800" dirty="0"/>
+              </a:p>
+            </p:txBody>
+          </p:sp>
+        </mc:Choice>
+        <mc:Fallback>
+          <p:sp>
+            <p:nvSpPr>
+              <p:cNvPr id="13" name="TextBox 12"/>
+              <p:cNvSpPr txBox="1">
+                <a:spLocks noRot="1" noChangeAspect="1" noMove="1" noResize="1" noEditPoints="1" noAdjustHandles="1" noChangeArrowheads="1" noChangeShapeType="1" noTextEdit="1"/>
+              </p:cNvSpPr>
+              <p:nvPr/>
+            </p:nvSpPr>
+            <p:spPr>
+              <a:xfrm>
+                <a:off x="15498443" y="17972921"/>
+                <a:ext cx="14324900" cy="11990398"/>
+              </a:xfrm>
+              <a:prstGeom prst="rect">
+                <a:avLst/>
+              </a:prstGeom>
+              <a:blipFill rotWithShape="0">
+                <a:blip r:embed="rId6"/>
+                <a:stretch>
+                  <a:fillRect l="-1915" t="-1220" r="-1957"/>
+                </a:stretch>
+              </a:blipFill>
+            </p:spPr>
+            <p:txBody>
+              <a:bodyPr/>
+              <a:lstStyle/>
+              <a:p>
+                <a:r>
+                  <a:rPr lang="en-US">
+                    <a:noFill/>
+                  </a:rPr>
+                  <a:t> </a:t>
+                </a:r>
+              </a:p>
+            </p:txBody>
+          </p:sp>
+        </mc:Fallback>
+      </mc:AlternateContent>
     </p:spTree>
   </p:cSld>
   <p:clrMapOvr>

</xml_diff>